<commit_message>
Update Virtual Assistant Design and implementation Using fine-tuned BERT  v0.1.pptx
</commit_message>
<xml_diff>
--- a/Virtual Assistant Design and implementation Using fine-tuned BERT  v0.1.pptx
+++ b/Virtual Assistant Design and implementation Using fine-tuned BERT  v0.1.pptx
@@ -5,10 +5,10 @@
     <p:sldMasterId id="2147483648" r:id="rId5"/>
   </p:sldMasterIdLst>
   <p:notesMasterIdLst>
-    <p:notesMasterId r:id="rId18"/>
+    <p:notesMasterId r:id="rId17"/>
   </p:notesMasterIdLst>
   <p:handoutMasterIdLst>
-    <p:handoutMasterId r:id="rId19"/>
+    <p:handoutMasterId r:id="rId18"/>
   </p:handoutMasterIdLst>
   <p:sldIdLst>
     <p:sldId id="338" r:id="rId6"/>
@@ -22,7 +22,6 @@
     <p:sldId id="364" r:id="rId14"/>
     <p:sldId id="374" r:id="rId15"/>
     <p:sldId id="375" r:id="rId16"/>
-    <p:sldId id="317" r:id="rId17"/>
   </p:sldIdLst>
   <p:sldSz cx="9144000" cy="6858000" type="screen4x3"/>
   <p:notesSz cx="6669088" cy="9867900"/>
@@ -5769,7 +5768,7 @@
           <a:p>
             <a:fld id="{505CC9E1-8D4D-43BF-8EA8-9F307632990C}" type="datetimeFigureOut">
               <a:rPr lang="en-US" smtClean="0"/>
-              <a:t>7/12/2022</a:t>
+              <a:t>12/3/2022</a:t>
             </a:fld>
             <a:endParaRPr lang="en-US" dirty="0"/>
           </a:p>
@@ -5934,7 +5933,7 @@
           <a:p>
             <a:fld id="{2CA38670-3511-4C78-809F-DED83F56DFE8}" type="datetimeFigureOut">
               <a:rPr lang="en-US" smtClean="0"/>
-              <a:t>7/12/2022</a:t>
+              <a:t>12/3/2022</a:t>
             </a:fld>
             <a:endParaRPr lang="en-US" dirty="0"/>
           </a:p>
@@ -6444,90 +6443,6 @@
     <p:extLst>
       <p:ext uri="{BB962C8B-B14F-4D97-AF65-F5344CB8AC3E}">
         <p14:creationId xmlns:p14="http://schemas.microsoft.com/office/powerpoint/2010/main" val="1288982791"/>
-      </p:ext>
-    </p:extLst>
-  </p:cSld>
-  <p:clrMapOvr>
-    <a:masterClrMapping/>
-  </p:clrMapOvr>
-</p:notes>
-</file>
-
-<file path=ppt/notesSlides/notesSlide12.xml><?xml version="1.0" encoding="utf-8"?>
-<p:notes xmlns:a="http://schemas.openxmlformats.org/drawingml/2006/main" xmlns:r="http://schemas.openxmlformats.org/officeDocument/2006/relationships" xmlns:p="http://schemas.openxmlformats.org/presentationml/2006/main">
-  <p:cSld>
-    <p:spTree>
-      <p:nvGrpSpPr>
-        <p:cNvPr id="1" name=""/>
-        <p:cNvGrpSpPr/>
-        <p:nvPr/>
-      </p:nvGrpSpPr>
-      <p:grpSpPr>
-        <a:xfrm>
-          <a:off x="0" y="0"/>
-          <a:ext cx="0" cy="0"/>
-          <a:chOff x="0" y="0"/>
-          <a:chExt cx="0" cy="0"/>
-        </a:xfrm>
-      </p:grpSpPr>
-      <p:sp>
-        <p:nvSpPr>
-          <p:cNvPr id="2" name="Slide Image Placeholder 1"/>
-          <p:cNvSpPr>
-            <a:spLocks noGrp="1" noRot="1" noChangeAspect="1"/>
-          </p:cNvSpPr>
-          <p:nvPr>
-            <p:ph type="sldImg"/>
-          </p:nvPr>
-        </p:nvSpPr>
-        <p:spPr/>
-      </p:sp>
-      <p:sp>
-        <p:nvSpPr>
-          <p:cNvPr id="3" name="Notes Placeholder 2"/>
-          <p:cNvSpPr>
-            <a:spLocks noGrp="1"/>
-          </p:cNvSpPr>
-          <p:nvPr>
-            <p:ph type="body" idx="1"/>
-          </p:nvPr>
-        </p:nvSpPr>
-        <p:spPr/>
-        <p:txBody>
-          <a:bodyPr/>
-          <a:lstStyle/>
-          <a:p>
-            <a:endParaRPr lang="en-US" dirty="0"/>
-          </a:p>
-        </p:txBody>
-      </p:sp>
-      <p:sp>
-        <p:nvSpPr>
-          <p:cNvPr id="4" name="Slide Number Placeholder 3"/>
-          <p:cNvSpPr>
-            <a:spLocks noGrp="1"/>
-          </p:cNvSpPr>
-          <p:nvPr>
-            <p:ph type="sldNum" sz="quarter" idx="10"/>
-          </p:nvPr>
-        </p:nvSpPr>
-        <p:spPr/>
-        <p:txBody>
-          <a:bodyPr/>
-          <a:lstStyle/>
-          <a:p>
-            <a:fld id="{A2840319-8488-4EEB-9ABF-5D91E1ABE483}" type="slidenum">
-              <a:rPr lang="en-US" smtClean="0"/>
-              <a:t>12</a:t>
-            </a:fld>
-            <a:endParaRPr lang="en-US" dirty="0"/>
-          </a:p>
-        </p:txBody>
-      </p:sp>
-    </p:spTree>
-    <p:extLst>
-      <p:ext uri="{BB962C8B-B14F-4D97-AF65-F5344CB8AC3E}">
-        <p14:creationId xmlns:p14="http://schemas.microsoft.com/office/powerpoint/2010/main" val="1030159139"/>
       </p:ext>
     </p:extLst>
   </p:cSld>
@@ -11993,7 +11908,7 @@
           <a:p>
             <a:fld id="{27E0D39E-E6E5-4880-8DD1-85774D966039}" type="datetimeFigureOut">
               <a:rPr lang="en-US" smtClean="0"/>
-              <a:t>7/12/2022</a:t>
+              <a:t>12/3/2022</a:t>
             </a:fld>
             <a:endParaRPr lang="en-US" dirty="0"/>
           </a:p>
@@ -21525,7 +21440,7 @@
           <a:p>
             <a:fld id="{6FFC76C0-D721-45ED-A7C8-1392EA472B0D}" type="datetimeFigureOut">
               <a:rPr lang="en-US" smtClean="0"/>
-              <a:t>7/12/2022</a:t>
+              <a:t>12/3/2022</a:t>
             </a:fld>
             <a:endParaRPr lang="en-US" dirty="0"/>
           </a:p>
@@ -25824,36 +25739,6 @@
     <p:extLst>
       <p:ext uri="{BB962C8B-B14F-4D97-AF65-F5344CB8AC3E}">
         <p14:creationId xmlns:p14="http://schemas.microsoft.com/office/powerpoint/2010/main" val="2636362982"/>
-      </p:ext>
-    </p:extLst>
-  </p:cSld>
-  <p:clrMapOvr>
-    <a:masterClrMapping/>
-  </p:clrMapOvr>
-</p:sld>
-</file>
-
-<file path=ppt/slides/slide12.xml><?xml version="1.0" encoding="utf-8"?>
-<p:sld xmlns:a="http://schemas.openxmlformats.org/drawingml/2006/main" xmlns:r="http://schemas.openxmlformats.org/officeDocument/2006/relationships" xmlns:p="http://schemas.openxmlformats.org/presentationml/2006/main">
-  <p:cSld>
-    <p:spTree>
-      <p:nvGrpSpPr>
-        <p:cNvPr id="1" name=""/>
-        <p:cNvGrpSpPr/>
-        <p:nvPr/>
-      </p:nvGrpSpPr>
-      <p:grpSpPr>
-        <a:xfrm>
-          <a:off x="0" y="0"/>
-          <a:ext cx="0" cy="0"/>
-          <a:chOff x="0" y="0"/>
-          <a:chExt cx="0" cy="0"/>
-        </a:xfrm>
-      </p:grpSpPr>
-    </p:spTree>
-    <p:extLst>
-      <p:ext uri="{BB962C8B-B14F-4D97-AF65-F5344CB8AC3E}">
-        <p14:creationId xmlns:p14="http://schemas.microsoft.com/office/powerpoint/2010/main" val="2928901907"/>
       </p:ext>
     </p:extLst>
   </p:cSld>
@@ -29747,15 +29632,6 @@
 </file>
 
 <file path=customXml/item1.xml><?xml version="1.0" encoding="utf-8"?>
-<?mso-contentType ?>
-<FormTemplates xmlns="http://schemas.microsoft.com/sharepoint/v3/contenttype/forms">
-  <Display>DocumentLibraryForm</Display>
-  <Edit>DocumentLibraryForm</Edit>
-  <New>DocumentLibraryForm</New>
-</FormTemplates>
-</file>
-
-<file path=customXml/item2.xml><?xml version="1.0" encoding="utf-8"?>
 <ct:contentTypeSchema xmlns:ct="http://schemas.microsoft.com/office/2006/metadata/contentType" xmlns:ma="http://schemas.microsoft.com/office/2006/metadata/properties/metaAttributes" ct:_="" ma:_="" ma:contentTypeName="Document" ma:contentTypeID="0x010100A0B9AF1AE3B123488760A0200FCD19AE" ma:contentTypeVersion="7" ma:contentTypeDescription="Create a new document." ma:contentTypeScope="" ma:versionID="44419c12259df1c0ebc84f044d991307">
   <xsd:schema xmlns:xsd="http://www.w3.org/2001/XMLSchema" xmlns:xs="http://www.w3.org/2001/XMLSchema" xmlns:p="http://schemas.microsoft.com/office/2006/metadata/properties" xmlns:ns2="1dd6ebef-b403-489d-bdc4-ecfa0f5a55b0" xmlns:ns3="71d3c8b1-5718-4150-9bd2-9d49b217ee5e" targetNamespace="http://schemas.microsoft.com/office/2006/metadata/properties" ma:root="true" ma:fieldsID="67126bd5608849825eaef9abc06ed27e" ns2:_="" ns3:_="">
     <xsd:import namespace="1dd6ebef-b403-489d-bdc4-ecfa0f5a55b0"/>
@@ -29938,26 +29814,27 @@
 </ct:contentTypeSchema>
 </file>
 
-<file path=customXml/item3.xml><?xml version="1.0" encoding="utf-8"?>
+<file path=customXml/item2.xml><?xml version="1.0" encoding="utf-8"?>
 <?mso-contentType ?>
-<SharedContentType xmlns="Microsoft.SharePoint.Taxonomy.ContentTypeSync" SourceId="e40374fb-a6cc-4854-989f-c1d94a7967ee" ContentTypeId="0x01" PreviousValue="false"/>
+<FormTemplates xmlns="http://schemas.microsoft.com/sharepoint/v3/contenttype/forms">
+  <Display>DocumentLibraryForm</Display>
+  <Edit>DocumentLibraryForm</Edit>
+  <New>DocumentLibraryForm</New>
+</FormTemplates>
 </file>
 
-<file path=customXml/item4.xml><?xml version="1.0" encoding="utf-8"?>
+<file path=customXml/item3.xml><?xml version="1.0" encoding="utf-8"?>
 <p:properties xmlns:p="http://schemas.microsoft.com/office/2006/metadata/properties" xmlns:xsi="http://www.w3.org/2001/XMLSchema-instance" xmlns:pc="http://schemas.microsoft.com/office/infopath/2007/PartnerControls">
   <documentManagement/>
 </p:properties>
 </file>
 
-<file path=customXml/itemProps1.xml><?xml version="1.0" encoding="utf-8"?>
-<ds:datastoreItem xmlns:ds="http://schemas.openxmlformats.org/officeDocument/2006/customXml" ds:itemID="{474E8F19-448D-4A6B-97A5-7724A13B7946}">
-  <ds:schemaRefs>
-    <ds:schemaRef ds:uri="http://schemas.microsoft.com/sharepoint/v3/contenttype/forms"/>
-  </ds:schemaRefs>
-</ds:datastoreItem>
+<file path=customXml/item4.xml><?xml version="1.0" encoding="utf-8"?>
+<?mso-contentType ?>
+<SharedContentType xmlns="Microsoft.SharePoint.Taxonomy.ContentTypeSync" SourceId="e40374fb-a6cc-4854-989f-c1d94a7967ee" ContentTypeId="0x01" PreviousValue="false"/>
 </file>
 
-<file path=customXml/itemProps2.xml><?xml version="1.0" encoding="utf-8"?>
+<file path=customXml/itemProps1.xml><?xml version="1.0" encoding="utf-8"?>
 <ds:datastoreItem xmlns:ds="http://schemas.openxmlformats.org/officeDocument/2006/customXml" ds:itemID="{A641F7F2-9EEC-4734-974C-F8C456859003}">
   <ds:schemaRefs>
     <ds:schemaRef ds:uri="http://schemas.microsoft.com/office/2006/metadata/contentType"/>
@@ -29976,15 +29853,15 @@
 </ds:datastoreItem>
 </file>
 
-<file path=customXml/itemProps3.xml><?xml version="1.0" encoding="utf-8"?>
-<ds:datastoreItem xmlns:ds="http://schemas.openxmlformats.org/officeDocument/2006/customXml" ds:itemID="{BEB88D0B-E59C-42F3-B58E-5C5488244A9E}">
+<file path=customXml/itemProps2.xml><?xml version="1.0" encoding="utf-8"?>
+<ds:datastoreItem xmlns:ds="http://schemas.openxmlformats.org/officeDocument/2006/customXml" ds:itemID="{474E8F19-448D-4A6B-97A5-7724A13B7946}">
   <ds:schemaRefs>
-    <ds:schemaRef ds:uri="Microsoft.SharePoint.Taxonomy.ContentTypeSync"/>
+    <ds:schemaRef ds:uri="http://schemas.microsoft.com/sharepoint/v3/contenttype/forms"/>
   </ds:schemaRefs>
 </ds:datastoreItem>
 </file>
 
-<file path=customXml/itemProps4.xml><?xml version="1.0" encoding="utf-8"?>
+<file path=customXml/itemProps3.xml><?xml version="1.0" encoding="utf-8"?>
 <ds:datastoreItem xmlns:ds="http://schemas.openxmlformats.org/officeDocument/2006/customXml" ds:itemID="{DD2F6AC6-4AB6-42DB-8C12-3537351C4EC1}">
   <ds:schemaRefs>
     <ds:schemaRef ds:uri="http://schemas.openxmlformats.org/package/2006/metadata/core-properties"/>
@@ -29998,4 +29875,12 @@
     <ds:schemaRef ds:uri="http://purl.org/dc/dcmitype/"/>
   </ds:schemaRefs>
 </ds:datastoreItem>
+</file>
+
+<file path=customXml/itemProps4.xml><?xml version="1.0" encoding="utf-8"?>
+<ds:datastoreItem xmlns:ds="http://schemas.openxmlformats.org/officeDocument/2006/customXml" ds:itemID="{BEB88D0B-E59C-42F3-B58E-5C5488244A9E}">
+  <ds:schemaRefs>
+    <ds:schemaRef ds:uri="Microsoft.SharePoint.Taxonomy.ContentTypeSync"/>
+  </ds:schemaRefs>
+</ds:datastoreItem>
 </file>
</xml_diff>